<commit_message>
Final draft of fatigue modelling post
</commit_message>
<xml_diff>
--- a/assets/images/2024-10-24-fatigue-modelling_files/figures.pptx
+++ b/assets/images/2024-10-24-fatigue-modelling_files/figures.pptx
@@ -111,7 +111,7 @@
 <file path=ppt/revisionInfo.xml><?xml version="1.0" encoding="utf-8"?>
 <p1510:revInfo xmlns:a="http://schemas.openxmlformats.org/drawingml/2006/main" xmlns:r="http://schemas.openxmlformats.org/officeDocument/2006/relationships" xmlns:p1510="http://schemas.microsoft.com/office/powerpoint/2015/10/main">
   <p1510:revLst>
-    <p1510:client id="{ADC998BD-62A8-EB48-A8ED-563A38108A23}" v="6" dt="2024-11-08T01:27:44.791"/>
+    <p1510:client id="{ADC998BD-62A8-EB48-A8ED-563A38108A23}" v="8" dt="2024-11-08T01:40:29.244"/>
   </p1510:revLst>
 </p1510:revInfo>
 </file>
@@ -3731,10 +3731,10 @@
       </p:grpSpPr>
       <p:grpSp>
         <p:nvGrpSpPr>
-          <p:cNvPr id="17" name="Group 16">
-            <a:extLst>
-              <a:ext uri="{FF2B5EF4-FFF2-40B4-BE49-F238E27FC236}">
-                <a16:creationId xmlns:a16="http://schemas.microsoft.com/office/drawing/2014/main" id="{6361CF12-A8CE-1834-C548-8EB7DABE116C}"/>
+          <p:cNvPr id="20" name="Group 19">
+            <a:extLst>
+              <a:ext uri="{FF2B5EF4-FFF2-40B4-BE49-F238E27FC236}">
+                <a16:creationId xmlns:a16="http://schemas.microsoft.com/office/drawing/2014/main" id="{FB03D651-AB32-DF07-87E7-DE8434C7FC55}"/>
               </a:ext>
             </a:extLst>
           </p:cNvPr>
@@ -3749,257 +3749,338 @@
             <a:chExt cx="6000053" cy="5658024"/>
           </a:xfrm>
         </p:grpSpPr>
-        <p:pic>
-          <p:nvPicPr>
-            <p:cNvPr id="4" name="Picture 5">
+        <p:grpSp>
+          <p:nvGrpSpPr>
+            <p:cNvPr id="17" name="Group 16">
               <a:extLst>
                 <a:ext uri="{FF2B5EF4-FFF2-40B4-BE49-F238E27FC236}">
-                  <a16:creationId xmlns:a16="http://schemas.microsoft.com/office/drawing/2014/main" id="{5CF24E38-E744-B8B8-B65F-E7B421B05867}"/>
+                  <a16:creationId xmlns:a16="http://schemas.microsoft.com/office/drawing/2014/main" id="{6361CF12-A8CE-1834-C548-8EB7DABE116C}"/>
                 </a:ext>
               </a:extLst>
             </p:cNvPr>
-            <p:cNvPicPr>
-              <a:picLocks noChangeAspect="1"/>
-            </p:cNvPicPr>
+            <p:cNvGrpSpPr/>
             <p:nvPr/>
-          </p:nvPicPr>
-          <p:blipFill rotWithShape="1">
-            <a:blip r:embed="rId2"/>
-            <a:srcRect l="5208" r="6172" b="2880"/>
-            <a:stretch/>
-          </p:blipFill>
-          <p:spPr>
+          </p:nvGrpSpPr>
+          <p:grpSpPr>
             <a:xfrm>
-              <a:off x="3422821" y="568411"/>
-              <a:ext cx="4893275" cy="5288692"/>
+              <a:off x="2894465" y="568411"/>
+              <a:ext cx="6000053" cy="5658024"/>
+              <a:chOff x="2894465" y="568411"/>
+              <a:chExt cx="6000053" cy="5658024"/>
             </a:xfrm>
-            <a:prstGeom prst="rect">
-              <a:avLst/>
-            </a:prstGeom>
-          </p:spPr>
-        </p:pic>
-        <p:sp>
-          <p:nvSpPr>
-            <p:cNvPr id="5" name="TextBox 4">
+          </p:grpSpPr>
+          <p:pic>
+            <p:nvPicPr>
+              <p:cNvPr id="4" name="Picture 5">
+                <a:extLst>
+                  <a:ext uri="{FF2B5EF4-FFF2-40B4-BE49-F238E27FC236}">
+                    <a16:creationId xmlns:a16="http://schemas.microsoft.com/office/drawing/2014/main" id="{5CF24E38-E744-B8B8-B65F-E7B421B05867}"/>
+                  </a:ext>
+                </a:extLst>
+              </p:cNvPr>
+              <p:cNvPicPr>
+                <a:picLocks noChangeAspect="1"/>
+              </p:cNvPicPr>
+              <p:nvPr/>
+            </p:nvPicPr>
+            <p:blipFill rotWithShape="1">
+              <a:blip r:embed="rId2"/>
+              <a:srcRect l="5208" r="6172" b="2880"/>
+              <a:stretch/>
+            </p:blipFill>
+            <p:spPr>
+              <a:xfrm>
+                <a:off x="3422821" y="568411"/>
+                <a:ext cx="4893275" cy="5288692"/>
+              </a:xfrm>
+              <a:prstGeom prst="rect">
+                <a:avLst/>
+              </a:prstGeom>
+            </p:spPr>
+          </p:pic>
+          <p:sp>
+            <p:nvSpPr>
+              <p:cNvPr id="5" name="TextBox 4">
+                <a:extLst>
+                  <a:ext uri="{FF2B5EF4-FFF2-40B4-BE49-F238E27FC236}">
+                    <a16:creationId xmlns:a16="http://schemas.microsoft.com/office/drawing/2014/main" id="{82DAA87B-C84F-AF80-7D49-C1777E1A95A1}"/>
+                  </a:ext>
+                </a:extLst>
+              </p:cNvPr>
+              <p:cNvSpPr txBox="1"/>
+              <p:nvPr/>
+            </p:nvSpPr>
+            <p:spPr>
+              <a:xfrm>
+                <a:off x="6096000" y="5371038"/>
+                <a:ext cx="2767913" cy="369332"/>
+              </a:xfrm>
+              <a:prstGeom prst="rect">
+                <a:avLst/>
+              </a:prstGeom>
+              <a:noFill/>
+            </p:spPr>
+            <p:txBody>
+              <a:bodyPr wrap="square" rtlCol="0">
+                <a:spAutoFit/>
+              </a:bodyPr>
+              <a:lstStyle/>
+              <a:p>
+                <a:pPr algn="ctr"/>
+                <a:r>
+                  <a:rPr lang="en-US" b="1" dirty="0"/>
+                  <a:t>Fatigue (S + C)</a:t>
+                </a:r>
+              </a:p>
+            </p:txBody>
+          </p:sp>
+          <p:sp>
+            <p:nvSpPr>
+              <p:cNvPr id="6" name="TextBox 5">
+                <a:extLst>
+                  <a:ext uri="{FF2B5EF4-FFF2-40B4-BE49-F238E27FC236}">
+                    <a16:creationId xmlns:a16="http://schemas.microsoft.com/office/drawing/2014/main" id="{82AA6F31-23E7-BF82-4A9B-1DA3AE29D6DF}"/>
+                  </a:ext>
+                </a:extLst>
+              </p:cNvPr>
+              <p:cNvSpPr txBox="1"/>
+              <p:nvPr/>
+            </p:nvSpPr>
+            <p:spPr>
+              <a:xfrm>
+                <a:off x="4625546" y="5857103"/>
+                <a:ext cx="2767913" cy="369332"/>
+              </a:xfrm>
+              <a:prstGeom prst="rect">
+                <a:avLst/>
+              </a:prstGeom>
+              <a:noFill/>
+            </p:spPr>
+            <p:txBody>
+              <a:bodyPr wrap="square" rtlCol="0">
+                <a:spAutoFit/>
+              </a:bodyPr>
+              <a:lstStyle/>
+              <a:p>
+                <a:pPr algn="ctr"/>
+                <a:r>
+                  <a:rPr lang="en-US" b="1" dirty="0"/>
+                  <a:t>Time of Day</a:t>
+                </a:r>
+              </a:p>
+            </p:txBody>
+          </p:sp>
+          <p:sp>
+            <p:nvSpPr>
+              <p:cNvPr id="7" name="TextBox 6">
+                <a:extLst>
+                  <a:ext uri="{FF2B5EF4-FFF2-40B4-BE49-F238E27FC236}">
+                    <a16:creationId xmlns:a16="http://schemas.microsoft.com/office/drawing/2014/main" id="{78F269F2-B8A7-C13D-950E-29DD9A7B2BF4}"/>
+                  </a:ext>
+                </a:extLst>
+              </p:cNvPr>
+              <p:cNvSpPr txBox="1"/>
+              <p:nvPr/>
+            </p:nvSpPr>
+            <p:spPr>
+              <a:xfrm>
+                <a:off x="2894465" y="643921"/>
+                <a:ext cx="2767913" cy="369332"/>
+              </a:xfrm>
+              <a:prstGeom prst="rect">
+                <a:avLst/>
+              </a:prstGeom>
+              <a:noFill/>
+            </p:spPr>
+            <p:txBody>
+              <a:bodyPr wrap="square" rtlCol="0">
+                <a:spAutoFit/>
+              </a:bodyPr>
+              <a:lstStyle/>
+              <a:p>
+                <a:pPr algn="ctr"/>
+                <a:r>
+                  <a:rPr lang="en-US" b="1" dirty="0"/>
+                  <a:t>Sleep</a:t>
+                </a:r>
+              </a:p>
+            </p:txBody>
+          </p:sp>
+          <p:sp>
+            <p:nvSpPr>
+              <p:cNvPr id="8" name="TextBox 7">
+                <a:extLst>
+                  <a:ext uri="{FF2B5EF4-FFF2-40B4-BE49-F238E27FC236}">
+                    <a16:creationId xmlns:a16="http://schemas.microsoft.com/office/drawing/2014/main" id="{C2AA7E70-ED30-F9D6-88C7-B9FFEBD06F44}"/>
+                  </a:ext>
+                </a:extLst>
+              </p:cNvPr>
+              <p:cNvSpPr txBox="1"/>
+              <p:nvPr/>
+            </p:nvSpPr>
+            <p:spPr>
+              <a:xfrm>
+                <a:off x="3961265" y="643921"/>
+                <a:ext cx="2767913" cy="369332"/>
+              </a:xfrm>
+              <a:prstGeom prst="rect">
+                <a:avLst/>
+              </a:prstGeom>
+              <a:noFill/>
+            </p:spPr>
+            <p:txBody>
+              <a:bodyPr wrap="square" rtlCol="0">
+                <a:spAutoFit/>
+              </a:bodyPr>
+              <a:lstStyle/>
+              <a:p>
+                <a:pPr algn="ctr"/>
+                <a:r>
+                  <a:rPr lang="en-US" b="1" dirty="0"/>
+                  <a:t>Wake</a:t>
+                </a:r>
+              </a:p>
+            </p:txBody>
+          </p:sp>
+          <p:sp>
+            <p:nvSpPr>
+              <p:cNvPr id="9" name="TextBox 8">
+                <a:extLst>
+                  <a:ext uri="{FF2B5EF4-FFF2-40B4-BE49-F238E27FC236}">
+                    <a16:creationId xmlns:a16="http://schemas.microsoft.com/office/drawing/2014/main" id="{D3225F7B-8CB9-276D-77C2-FFCE39CE0024}"/>
+                  </a:ext>
+                </a:extLst>
+              </p:cNvPr>
+              <p:cNvSpPr txBox="1"/>
+              <p:nvPr/>
+            </p:nvSpPr>
+            <p:spPr>
+              <a:xfrm>
+                <a:off x="5948287" y="1981534"/>
+                <a:ext cx="2767913" cy="369332"/>
+              </a:xfrm>
+              <a:prstGeom prst="rect">
+                <a:avLst/>
+              </a:prstGeom>
+              <a:noFill/>
+            </p:spPr>
+            <p:txBody>
+              <a:bodyPr wrap="square" rtlCol="0">
+                <a:spAutoFit/>
+              </a:bodyPr>
+              <a:lstStyle/>
+              <a:p>
+                <a:pPr algn="ctr"/>
+                <a:r>
+                  <a:rPr lang="en-US" b="1" dirty="0"/>
+                  <a:t>Homeostatic (S)</a:t>
+                </a:r>
+              </a:p>
+            </p:txBody>
+          </p:sp>
+          <p:sp>
+            <p:nvSpPr>
+              <p:cNvPr id="10" name="TextBox 9">
+                <a:extLst>
+                  <a:ext uri="{FF2B5EF4-FFF2-40B4-BE49-F238E27FC236}">
+                    <a16:creationId xmlns:a16="http://schemas.microsoft.com/office/drawing/2014/main" id="{09B337EF-E145-59BA-01AC-A64E4F36B193}"/>
+                  </a:ext>
+                </a:extLst>
+              </p:cNvPr>
+              <p:cNvSpPr txBox="1"/>
+              <p:nvPr/>
+            </p:nvSpPr>
+            <p:spPr>
+              <a:xfrm>
+                <a:off x="6126605" y="3664093"/>
+                <a:ext cx="2767913" cy="369332"/>
+              </a:xfrm>
+              <a:prstGeom prst="rect">
+                <a:avLst/>
+              </a:prstGeom>
+              <a:noFill/>
+            </p:spPr>
+            <p:txBody>
+              <a:bodyPr wrap="square" rtlCol="0">
+                <a:spAutoFit/>
+              </a:bodyPr>
+              <a:lstStyle/>
+              <a:p>
+                <a:pPr algn="ctr"/>
+                <a:r>
+                  <a:rPr lang="en-US" b="1" dirty="0"/>
+                  <a:t>Circadian (C)</a:t>
+                </a:r>
+              </a:p>
+            </p:txBody>
+          </p:sp>
+          <p:pic>
+            <p:nvPicPr>
+              <p:cNvPr id="12" name="Picture 11">
+                <a:extLst>
+                  <a:ext uri="{FF2B5EF4-FFF2-40B4-BE49-F238E27FC236}">
+                    <a16:creationId xmlns:a16="http://schemas.microsoft.com/office/drawing/2014/main" id="{21C916C1-2CE1-3A97-23EA-F11A4412CCB7}"/>
+                  </a:ext>
+                </a:extLst>
+              </p:cNvPr>
+              <p:cNvPicPr>
+                <a:picLocks noChangeAspect="1"/>
+              </p:cNvPicPr>
+              <p:nvPr/>
+            </p:nvPicPr>
+            <p:blipFill>
+              <a:blip r:embed="rId3"/>
+              <a:stretch>
+                <a:fillRect/>
+              </a:stretch>
+            </p:blipFill>
+            <p:spPr>
+              <a:xfrm>
+                <a:off x="3961266" y="1864505"/>
+                <a:ext cx="2108200" cy="215900"/>
+              </a:xfrm>
+              <a:prstGeom prst="rect">
+                <a:avLst/>
+              </a:prstGeom>
+            </p:spPr>
+          </p:pic>
+          <p:pic>
+            <p:nvPicPr>
+              <p:cNvPr id="16" name="Picture 15">
+                <a:extLst>
+                  <a:ext uri="{FF2B5EF4-FFF2-40B4-BE49-F238E27FC236}">
+                    <a16:creationId xmlns:a16="http://schemas.microsoft.com/office/drawing/2014/main" id="{BD8EB480-EE6E-A3C5-8CD4-0AB9EA40DB8E}"/>
+                  </a:ext>
+                </a:extLst>
+              </p:cNvPr>
+              <p:cNvPicPr>
+                <a:picLocks noChangeAspect="1"/>
+              </p:cNvPicPr>
+              <p:nvPr/>
+            </p:nvPicPr>
+            <p:blipFill>
+              <a:blip r:embed="rId4"/>
+              <a:stretch>
+                <a:fillRect/>
+              </a:stretch>
+            </p:blipFill>
+            <p:spPr>
+              <a:xfrm>
+                <a:off x="4001243" y="3627795"/>
+                <a:ext cx="2413000" cy="419100"/>
+              </a:xfrm>
+              <a:prstGeom prst="rect">
+                <a:avLst/>
+              </a:prstGeom>
+            </p:spPr>
+          </p:pic>
+        </p:grpSp>
+        <p:pic>
+          <p:nvPicPr>
+            <p:cNvPr id="19" name="Picture 18">
               <a:extLst>
                 <a:ext uri="{FF2B5EF4-FFF2-40B4-BE49-F238E27FC236}">
-                  <a16:creationId xmlns:a16="http://schemas.microsoft.com/office/drawing/2014/main" id="{82DAA87B-C84F-AF80-7D49-C1777E1A95A1}"/>
-                </a:ext>
-              </a:extLst>
-            </p:cNvPr>
-            <p:cNvSpPr txBox="1"/>
-            <p:nvPr/>
-          </p:nvSpPr>
-          <p:spPr>
-            <a:xfrm>
-              <a:off x="6096000" y="5371038"/>
-              <a:ext cx="2767913" cy="369332"/>
-            </a:xfrm>
-            <a:prstGeom prst="rect">
-              <a:avLst/>
-            </a:prstGeom>
-            <a:noFill/>
-          </p:spPr>
-          <p:txBody>
-            <a:bodyPr wrap="square" rtlCol="0">
-              <a:spAutoFit/>
-            </a:bodyPr>
-            <a:lstStyle/>
-            <a:p>
-              <a:pPr algn="ctr"/>
-              <a:r>
-                <a:rPr lang="en-US" b="1" dirty="0"/>
-                <a:t>Fatigue (S + C)</a:t>
-              </a:r>
-            </a:p>
-          </p:txBody>
-        </p:sp>
-        <p:sp>
-          <p:nvSpPr>
-            <p:cNvPr id="6" name="TextBox 5">
-              <a:extLst>
-                <a:ext uri="{FF2B5EF4-FFF2-40B4-BE49-F238E27FC236}">
-                  <a16:creationId xmlns:a16="http://schemas.microsoft.com/office/drawing/2014/main" id="{82AA6F31-23E7-BF82-4A9B-1DA3AE29D6DF}"/>
-                </a:ext>
-              </a:extLst>
-            </p:cNvPr>
-            <p:cNvSpPr txBox="1"/>
-            <p:nvPr/>
-          </p:nvSpPr>
-          <p:spPr>
-            <a:xfrm>
-              <a:off x="4625546" y="5857103"/>
-              <a:ext cx="2767913" cy="369332"/>
-            </a:xfrm>
-            <a:prstGeom prst="rect">
-              <a:avLst/>
-            </a:prstGeom>
-            <a:noFill/>
-          </p:spPr>
-          <p:txBody>
-            <a:bodyPr wrap="square" rtlCol="0">
-              <a:spAutoFit/>
-            </a:bodyPr>
-            <a:lstStyle/>
-            <a:p>
-              <a:pPr algn="ctr"/>
-              <a:r>
-                <a:rPr lang="en-US" b="1" dirty="0"/>
-                <a:t>Time of Day</a:t>
-              </a:r>
-            </a:p>
-          </p:txBody>
-        </p:sp>
-        <p:sp>
-          <p:nvSpPr>
-            <p:cNvPr id="7" name="TextBox 6">
-              <a:extLst>
-                <a:ext uri="{FF2B5EF4-FFF2-40B4-BE49-F238E27FC236}">
-                  <a16:creationId xmlns:a16="http://schemas.microsoft.com/office/drawing/2014/main" id="{78F269F2-B8A7-C13D-950E-29DD9A7B2BF4}"/>
-                </a:ext>
-              </a:extLst>
-            </p:cNvPr>
-            <p:cNvSpPr txBox="1"/>
-            <p:nvPr/>
-          </p:nvSpPr>
-          <p:spPr>
-            <a:xfrm>
-              <a:off x="2894465" y="643921"/>
-              <a:ext cx="2767913" cy="369332"/>
-            </a:xfrm>
-            <a:prstGeom prst="rect">
-              <a:avLst/>
-            </a:prstGeom>
-            <a:noFill/>
-          </p:spPr>
-          <p:txBody>
-            <a:bodyPr wrap="square" rtlCol="0">
-              <a:spAutoFit/>
-            </a:bodyPr>
-            <a:lstStyle/>
-            <a:p>
-              <a:pPr algn="ctr"/>
-              <a:r>
-                <a:rPr lang="en-US" b="1" dirty="0"/>
-                <a:t>Sleep</a:t>
-              </a:r>
-            </a:p>
-          </p:txBody>
-        </p:sp>
-        <p:sp>
-          <p:nvSpPr>
-            <p:cNvPr id="8" name="TextBox 7">
-              <a:extLst>
-                <a:ext uri="{FF2B5EF4-FFF2-40B4-BE49-F238E27FC236}">
-                  <a16:creationId xmlns:a16="http://schemas.microsoft.com/office/drawing/2014/main" id="{C2AA7E70-ED30-F9D6-88C7-B9FFEBD06F44}"/>
-                </a:ext>
-              </a:extLst>
-            </p:cNvPr>
-            <p:cNvSpPr txBox="1"/>
-            <p:nvPr/>
-          </p:nvSpPr>
-          <p:spPr>
-            <a:xfrm>
-              <a:off x="3961265" y="643921"/>
-              <a:ext cx="2767913" cy="369332"/>
-            </a:xfrm>
-            <a:prstGeom prst="rect">
-              <a:avLst/>
-            </a:prstGeom>
-            <a:noFill/>
-          </p:spPr>
-          <p:txBody>
-            <a:bodyPr wrap="square" rtlCol="0">
-              <a:spAutoFit/>
-            </a:bodyPr>
-            <a:lstStyle/>
-            <a:p>
-              <a:pPr algn="ctr"/>
-              <a:r>
-                <a:rPr lang="en-US" b="1" dirty="0"/>
-                <a:t>Wake</a:t>
-              </a:r>
-            </a:p>
-          </p:txBody>
-        </p:sp>
-        <p:sp>
-          <p:nvSpPr>
-            <p:cNvPr id="9" name="TextBox 8">
-              <a:extLst>
-                <a:ext uri="{FF2B5EF4-FFF2-40B4-BE49-F238E27FC236}">
-                  <a16:creationId xmlns:a16="http://schemas.microsoft.com/office/drawing/2014/main" id="{D3225F7B-8CB9-276D-77C2-FFCE39CE0024}"/>
-                </a:ext>
-              </a:extLst>
-            </p:cNvPr>
-            <p:cNvSpPr txBox="1"/>
-            <p:nvPr/>
-          </p:nvSpPr>
-          <p:spPr>
-            <a:xfrm>
-              <a:off x="5948287" y="1981534"/>
-              <a:ext cx="2767913" cy="369332"/>
-            </a:xfrm>
-            <a:prstGeom prst="rect">
-              <a:avLst/>
-            </a:prstGeom>
-            <a:noFill/>
-          </p:spPr>
-          <p:txBody>
-            <a:bodyPr wrap="square" rtlCol="0">
-              <a:spAutoFit/>
-            </a:bodyPr>
-            <a:lstStyle/>
-            <a:p>
-              <a:pPr algn="ctr"/>
-              <a:r>
-                <a:rPr lang="en-US" b="1" dirty="0"/>
-                <a:t>Homeostatic (S)</a:t>
-              </a:r>
-            </a:p>
-          </p:txBody>
-        </p:sp>
-        <p:sp>
-          <p:nvSpPr>
-            <p:cNvPr id="10" name="TextBox 9">
-              <a:extLst>
-                <a:ext uri="{FF2B5EF4-FFF2-40B4-BE49-F238E27FC236}">
-                  <a16:creationId xmlns:a16="http://schemas.microsoft.com/office/drawing/2014/main" id="{09B337EF-E145-59BA-01AC-A64E4F36B193}"/>
-                </a:ext>
-              </a:extLst>
-            </p:cNvPr>
-            <p:cNvSpPr txBox="1"/>
-            <p:nvPr/>
-          </p:nvSpPr>
-          <p:spPr>
-            <a:xfrm>
-              <a:off x="6126605" y="3664093"/>
-              <a:ext cx="2767913" cy="369332"/>
-            </a:xfrm>
-            <a:prstGeom prst="rect">
-              <a:avLst/>
-            </a:prstGeom>
-            <a:noFill/>
-          </p:spPr>
-          <p:txBody>
-            <a:bodyPr wrap="square" rtlCol="0">
-              <a:spAutoFit/>
-            </a:bodyPr>
-            <a:lstStyle/>
-            <a:p>
-              <a:pPr algn="ctr"/>
-              <a:r>
-                <a:rPr lang="en-US" b="1" dirty="0"/>
-                <a:t>Circadian (C)</a:t>
-              </a:r>
-            </a:p>
-          </p:txBody>
-        </p:sp>
-        <p:pic>
-          <p:nvPicPr>
-            <p:cNvPr id="12" name="Picture 11">
-              <a:extLst>
-                <a:ext uri="{FF2B5EF4-FFF2-40B4-BE49-F238E27FC236}">
-                  <a16:creationId xmlns:a16="http://schemas.microsoft.com/office/drawing/2014/main" id="{21C916C1-2CE1-3A97-23EA-F11A4412CCB7}"/>
+                  <a16:creationId xmlns:a16="http://schemas.microsoft.com/office/drawing/2014/main" id="{131D01C3-E0F9-A5AE-D4A5-A03BEAA38253}"/>
                 </a:ext>
               </a:extLst>
             </p:cNvPr>
@@ -4009,45 +4090,15 @@
             <p:nvPr/>
           </p:nvPicPr>
           <p:blipFill>
-            <a:blip r:embed="rId3"/>
+            <a:blip r:embed="rId5"/>
             <a:stretch>
               <a:fillRect/>
             </a:stretch>
           </p:blipFill>
           <p:spPr>
             <a:xfrm>
-              <a:off x="4001243" y="2043607"/>
-              <a:ext cx="2193963" cy="224683"/>
-            </a:xfrm>
-            <a:prstGeom prst="rect">
-              <a:avLst/>
-            </a:prstGeom>
-          </p:spPr>
-        </p:pic>
-        <p:pic>
-          <p:nvPicPr>
-            <p:cNvPr id="16" name="Picture 15">
-              <a:extLst>
-                <a:ext uri="{FF2B5EF4-FFF2-40B4-BE49-F238E27FC236}">
-                  <a16:creationId xmlns:a16="http://schemas.microsoft.com/office/drawing/2014/main" id="{BD8EB480-EE6E-A3C5-8CD4-0AB9EA40DB8E}"/>
-                </a:ext>
-              </a:extLst>
-            </p:cNvPr>
-            <p:cNvPicPr>
-              <a:picLocks noChangeAspect="1"/>
-            </p:cNvPicPr>
-            <p:nvPr/>
-          </p:nvPicPr>
-          <p:blipFill>
-            <a:blip r:embed="rId4"/>
-            <a:stretch>
-              <a:fillRect/>
-            </a:stretch>
-          </p:blipFill>
-          <p:spPr>
-            <a:xfrm>
-              <a:off x="4001243" y="3627795"/>
-              <a:ext cx="2413000" cy="419100"/>
+              <a:off x="3950689" y="2103134"/>
+              <a:ext cx="2070100" cy="215900"/>
             </a:xfrm>
             <a:prstGeom prst="rect">
               <a:avLst/>

</xml_diff>